<commit_message>
specification plan has been uploaded and ready for review. please do that and let me know
</commit_message>
<xml_diff>
--- a/Power Point Presentation-bk.pptx
+++ b/Power Point Presentation-bk.pptx
@@ -5,7 +5,7 @@
     <p:sldMasterId id="2147483704" r:id="rId1"/>
   </p:sldMasterIdLst>
   <p:notesMasterIdLst>
-    <p:notesMasterId r:id="rId26"/>
+    <p:notesMasterId r:id="rId27"/>
   </p:notesMasterIdLst>
   <p:sldIdLst>
     <p:sldId id="256" r:id="rId2"/>
@@ -32,6 +32,7 @@
     <p:sldId id="284" r:id="rId23"/>
     <p:sldId id="285" r:id="rId24"/>
     <p:sldId id="286" r:id="rId25"/>
+    <p:sldId id="287" r:id="rId26"/>
   </p:sldIdLst>
   <p:sldSz cx="9144000" cy="6858000" type="screen4x3"/>
   <p:notesSz cx="6858000" cy="9144000"/>
@@ -7720,23 +7721,7 @@
                   <a:schemeClr val="tx1"/>
                 </a:solidFill>
               </a:rPr>
-              <a:t>The </a:t>
-            </a:r>
-            <a:r>
-              <a:rPr lang="en-US" dirty="0" smtClean="0">
-                <a:solidFill>
-                  <a:schemeClr val="tx1"/>
-                </a:solidFill>
-              </a:rPr>
-              <a:t>player vs AI mode is going against th</a:t>
-            </a:r>
-            <a:r>
-              <a:rPr lang="en-US" dirty="0" smtClean="0">
-                <a:solidFill>
-                  <a:schemeClr val="tx1"/>
-                </a:solidFill>
-              </a:rPr>
-              <a:t>e artificial intelligence.</a:t>
+              <a:t>The player vs AI mode is going against the artificial intelligence.</a:t>
             </a:r>
           </a:p>
           <a:p>
@@ -9113,11 +9098,6 @@
               </a:rPr>
               <a:t>And foremost, each person will be there to help in case they have finished a task earlier than normal</a:t>
             </a:r>
-            <a:endParaRPr lang="en-US" dirty="0" smtClean="0">
-              <a:solidFill>
-                <a:schemeClr val="tx1"/>
-              </a:solidFill>
-            </a:endParaRPr>
           </a:p>
         </p:txBody>
       </p:sp>
@@ -9219,8 +9199,36 @@
                   <a:schemeClr val="tx1"/>
                 </a:solidFill>
               </a:rPr>
-              <a:t>For financing the project, it will not cost us nothing because it is a school/academic project.</a:t>
-            </a:r>
+              <a:t>For financing the project, it will not cost us nothing because it is a school/academic project</a:t>
+            </a:r>
+            <a:r>
+              <a:rPr lang="en-US" dirty="0" smtClean="0">
+                <a:solidFill>
+                  <a:schemeClr val="tx1"/>
+                </a:solidFill>
+              </a:rPr>
+              <a:t>.</a:t>
+            </a:r>
+          </a:p>
+          <a:p>
+            <a:pPr>
+              <a:buFont typeface="Arial" panose="020B0604020202020204" pitchFamily="34" charset="0"/>
+              <a:buChar char="•"/>
+            </a:pPr>
+            <a:r>
+              <a:rPr lang="en-US" dirty="0" smtClean="0">
+                <a:solidFill>
+                  <a:schemeClr val="tx1"/>
+                </a:solidFill>
+              </a:rPr>
+              <a:t>Not any of our developers will be paid therefore, enjoy the free game </a:t>
+            </a:r>
+          </a:p>
+          <a:p>
+            <a:pPr>
+              <a:buFont typeface="Arial" panose="020B0604020202020204" pitchFamily="34" charset="0"/>
+              <a:buChar char="•"/>
+            </a:pPr>
             <a:endParaRPr lang="en-US" dirty="0">
               <a:solidFill>
                 <a:schemeClr val="tx1"/>
@@ -9244,6 +9252,106 @@
     <p:extLst>
       <p:ext uri="{BB962C8B-B14F-4D97-AF65-F5344CB8AC3E}">
         <p14:creationId xmlns:p14="http://schemas.microsoft.com/office/powerpoint/2010/main" val="3493622036"/>
+      </p:ext>
+    </p:extLst>
+  </p:cSld>
+  <p:clrMapOvr>
+    <a:masterClrMapping/>
+  </p:clrMapOvr>
+  <p:timing>
+    <p:tnLst>
+      <p:par>
+        <p:cTn id="1" dur="indefinite" restart="never" nodeType="tmRoot"/>
+      </p:par>
+    </p:tnLst>
+  </p:timing>
+</p:sld>
+</file>
+
+<file path=ppt/slides/slide25.xml><?xml version="1.0" encoding="utf-8"?>
+<p:sld xmlns:a="http://schemas.openxmlformats.org/drawingml/2006/main" xmlns:r="http://schemas.openxmlformats.org/officeDocument/2006/relationships" xmlns:p="http://schemas.openxmlformats.org/presentationml/2006/main">
+  <p:cSld>
+    <p:spTree>
+      <p:nvGrpSpPr>
+        <p:cNvPr id="1" name=""/>
+        <p:cNvGrpSpPr/>
+        <p:nvPr/>
+      </p:nvGrpSpPr>
+      <p:grpSpPr>
+        <a:xfrm>
+          <a:off x="0" y="0"/>
+          <a:ext cx="0" cy="0"/>
+          <a:chOff x="0" y="0"/>
+          <a:chExt cx="0" cy="0"/>
+        </a:xfrm>
+      </p:grpSpPr>
+      <p:sp>
+        <p:nvSpPr>
+          <p:cNvPr id="2" name="Title 1"/>
+          <p:cNvSpPr>
+            <a:spLocks noGrp="1"/>
+          </p:cNvSpPr>
+          <p:nvPr>
+            <p:ph type="title"/>
+          </p:nvPr>
+        </p:nvSpPr>
+        <p:spPr>
+          <a:xfrm>
+            <a:off x="533400" y="307848"/>
+            <a:ext cx="6554867" cy="1524000"/>
+          </a:xfrm>
+        </p:spPr>
+        <p:txBody>
+          <a:bodyPr/>
+          <a:lstStyle/>
+          <a:p>
+            <a:pPr algn="ctr"/>
+            <a:r>
+              <a:rPr lang="en-US" dirty="0" smtClean="0"/>
+              <a:t>Class diagrams</a:t>
+            </a:r>
+            <a:endParaRPr lang="en-US" dirty="0"/>
+          </a:p>
+        </p:txBody>
+      </p:sp>
+      <p:sp>
+        <p:nvSpPr>
+          <p:cNvPr id="3" name="Content Placeholder 2"/>
+          <p:cNvSpPr>
+            <a:spLocks noGrp="1"/>
+          </p:cNvSpPr>
+          <p:nvPr>
+            <p:ph idx="1"/>
+          </p:nvPr>
+        </p:nvSpPr>
+        <p:spPr>
+          <a:xfrm>
+            <a:off x="890016" y="1941576"/>
+            <a:ext cx="6554867" cy="3767670"/>
+          </a:xfrm>
+        </p:spPr>
+        <p:txBody>
+          <a:bodyPr>
+            <a:normAutofit/>
+          </a:bodyPr>
+          <a:lstStyle/>
+          <a:p>
+            <a:pPr>
+              <a:buFont typeface="Arial" panose="020B0604020202020204" pitchFamily="34" charset="0"/>
+              <a:buChar char="•"/>
+            </a:pPr>
+            <a:endParaRPr lang="en-US" dirty="0" smtClean="0">
+              <a:solidFill>
+                <a:schemeClr val="tx1"/>
+              </a:solidFill>
+            </a:endParaRPr>
+          </a:p>
+        </p:txBody>
+      </p:sp>
+    </p:spTree>
+    <p:extLst>
+      <p:ext uri="{BB962C8B-B14F-4D97-AF65-F5344CB8AC3E}">
+        <p14:creationId xmlns:p14="http://schemas.microsoft.com/office/powerpoint/2010/main" val="3170845308"/>
       </p:ext>
     </p:extLst>
   </p:cSld>
@@ -9707,21 +9815,8 @@
                   <a:schemeClr val="tx1"/>
                 </a:solidFill>
               </a:rPr>
-              <a:t>Player vs Player (</a:t>
-            </a:r>
-            <a:r>
-              <a:rPr lang="en-US" dirty="0" smtClean="0">
-                <a:solidFill>
-                  <a:schemeClr val="tx1"/>
-                </a:solidFill>
-              </a:rPr>
-              <a:t>PvsP)</a:t>
-            </a:r>
-            <a:endParaRPr lang="en-US" dirty="0" smtClean="0">
-              <a:solidFill>
-                <a:schemeClr val="tx1"/>
-              </a:solidFill>
-            </a:endParaRPr>
+              <a:t>Player vs Player (PvsP)</a:t>
+            </a:r>
           </a:p>
           <a:p>
             <a:pPr marL="742950" lvl="1" indent="-285750" algn="l">

</xml_diff>